<commit_message>
Added title, roles, and changed licensing placement. Specified location of git repository. Updated slides.
</commit_message>
<xml_diff>
--- a/presentation.pptx
+++ b/presentation.pptx
@@ -9,10 +9,10 @@
   </p:notesMasterIdLst>
   <p:sldIdLst>
     <p:sldId id="256" r:id="rId2"/>
-    <p:sldId id="261" r:id="rId3"/>
-    <p:sldId id="257" r:id="rId4"/>
-    <p:sldId id="258" r:id="rId5"/>
-    <p:sldId id="262" r:id="rId6"/>
+    <p:sldId id="257" r:id="rId3"/>
+    <p:sldId id="258" r:id="rId4"/>
+    <p:sldId id="262" r:id="rId5"/>
+    <p:sldId id="261" r:id="rId6"/>
   </p:sldIdLst>
   <p:sldSz cx="12192000" cy="6858000"/>
   <p:notesSz cx="6858000" cy="9144000"/>
@@ -201,7 +201,7 @@
           <a:p>
             <a:fld id="{88ADF0C9-B6B3-4E32-BBBC-1AAF884BB291}" type="datetimeFigureOut">
               <a:rPr lang="en-US" smtClean="0"/>
-              <a:t>4/27/2016</a:t>
+              <a:t>6/6/2016</a:t>
             </a:fld>
             <a:endParaRPr lang="en-US"/>
           </a:p>
@@ -618,7 +618,7 @@
           <a:p>
             <a:fld id="{CA735268-B7A0-40A1-9693-9641AD7274A6}" type="slidenum">
               <a:rPr lang="en-US" smtClean="0"/>
-              <a:t>2</a:t>
+              <a:t>5</a:t>
             </a:fld>
             <a:endParaRPr lang="en-US"/>
           </a:p>
@@ -777,9 +777,9 @@
           <a:bodyPr/>
           <a:lstStyle/>
           <a:p>
-            <a:fld id="{5A7A7EBC-D663-4D79-9B0F-2025408D4697}" type="datetime1">
-              <a:rPr lang="en-US" smtClean="0"/>
-              <a:t>4/29/2016</a:t>
+            <a:fld id="{2B5F910F-0D88-44E7-9D16-729126A4368A}" type="datetime1">
+              <a:rPr lang="en-US" smtClean="0"/>
+              <a:t>6/6/2016</a:t>
             </a:fld>
             <a:endParaRPr lang="en-US" dirty="0"/>
           </a:p>
@@ -800,10 +800,6 @@
           <a:bodyPr/>
           <a:lstStyle/>
           <a:p>
-            <a:r>
-              <a:rPr lang="en-US" smtClean="0"/>
-              <a:t>https://github.com/StoneyJackson/git-ccscne-2016</a:t>
-            </a:r>
             <a:endParaRPr lang="en-US" dirty="0"/>
           </a:p>
         </p:txBody>
@@ -959,9 +955,9 @@
           <a:bodyPr/>
           <a:lstStyle/>
           <a:p>
-            <a:fld id="{D0824CDC-EE23-4A97-ACDC-0EE137AAFE4E}" type="datetime1">
-              <a:rPr lang="en-US" smtClean="0"/>
-              <a:t>4/29/2016</a:t>
+            <a:fld id="{9CF3F760-62F5-417C-B9F2-8B4B78CC9BCD}" type="datetime1">
+              <a:rPr lang="en-US" smtClean="0"/>
+              <a:t>6/6/2016</a:t>
             </a:fld>
             <a:endParaRPr lang="en-US"/>
           </a:p>
@@ -982,11 +978,7 @@
           <a:bodyPr/>
           <a:lstStyle/>
           <a:p>
-            <a:r>
-              <a:rPr lang="en-US" smtClean="0"/>
-              <a:t>https://github.com/StoneyJackson/git-ccscne-2016</a:t>
-            </a:r>
-            <a:endParaRPr lang="en-US"/>
+            <a:endParaRPr lang="en-US" dirty="0"/>
           </a:p>
         </p:txBody>
       </p:sp>
@@ -1150,9 +1142,9 @@
           <a:bodyPr/>
           <a:lstStyle/>
           <a:p>
-            <a:fld id="{9D1A99A9-A915-432E-9DE7-54EABEE01F4A}" type="datetime1">
-              <a:rPr lang="en-US" smtClean="0"/>
-              <a:t>4/29/2016</a:t>
+            <a:fld id="{8E7C9C65-3AA0-4851-8075-1EB08FC69F4E}" type="datetime1">
+              <a:rPr lang="en-US" smtClean="0"/>
+              <a:t>6/6/2016</a:t>
             </a:fld>
             <a:endParaRPr lang="en-US"/>
           </a:p>
@@ -1173,11 +1165,7 @@
           <a:bodyPr/>
           <a:lstStyle/>
           <a:p>
-            <a:r>
-              <a:rPr lang="en-US" smtClean="0"/>
-              <a:t>https://github.com/StoneyJackson/git-ccscne-2016</a:t>
-            </a:r>
-            <a:endParaRPr lang="en-US"/>
+            <a:endParaRPr lang="en-US" dirty="0"/>
           </a:p>
         </p:txBody>
       </p:sp>
@@ -1418,9 +1406,9 @@
             </a:lvl1pPr>
           </a:lstStyle>
           <a:p>
-            <a:fld id="{5FF9D344-A4AA-4F4C-9245-6E8F2F53074A}" type="datetime1">
-              <a:rPr lang="en-US" smtClean="0"/>
-              <a:t>4/29/2016</a:t>
+            <a:fld id="{EC366BEE-34BB-4E8F-AB0B-A88608F1D06F}" type="datetime1">
+              <a:rPr lang="en-US" smtClean="0"/>
+              <a:t>6/6/2016</a:t>
             </a:fld>
             <a:endParaRPr lang="en-US" dirty="0"/>
           </a:p>
@@ -1449,10 +1437,6 @@
             </a:lvl1pPr>
           </a:lstStyle>
           <a:p>
-            <a:r>
-              <a:rPr lang="en-US" smtClean="0"/>
-              <a:t>https://github.com/StoneyJackson/git-ccscne-2016</a:t>
-            </a:r>
             <a:endParaRPr lang="en-US" dirty="0"/>
           </a:p>
         </p:txBody>
@@ -1651,9 +1635,9 @@
           <a:bodyPr/>
           <a:lstStyle/>
           <a:p>
-            <a:fld id="{7E64E287-0B7A-42EA-863F-9CF5D29988C6}" type="datetime1">
-              <a:rPr lang="en-US" smtClean="0"/>
-              <a:t>4/29/2016</a:t>
+            <a:fld id="{269941EC-57CC-43A3-9CD2-BCDE132CB878}" type="datetime1">
+              <a:rPr lang="en-US" smtClean="0"/>
+              <a:t>6/6/2016</a:t>
             </a:fld>
             <a:endParaRPr lang="en-US"/>
           </a:p>
@@ -1674,10 +1658,6 @@
           <a:bodyPr/>
           <a:lstStyle/>
           <a:p>
-            <a:r>
-              <a:rPr lang="en-US" dirty="0" smtClean="0"/>
-              <a:t>https://github.com/StoneyJackson/git-ccscne-2016</a:t>
-            </a:r>
             <a:endParaRPr lang="en-US" dirty="0"/>
           </a:p>
         </p:txBody>
@@ -1913,9 +1893,9 @@
           <a:bodyPr/>
           <a:lstStyle/>
           <a:p>
-            <a:fld id="{7A03C4B0-F0A3-4BA6-9507-67FC2EED8A98}" type="datetime1">
-              <a:rPr lang="en-US" smtClean="0"/>
-              <a:t>4/29/2016</a:t>
+            <a:fld id="{70D58B8C-9D91-411E-9226-EACD3B4EF0B1}" type="datetime1">
+              <a:rPr lang="en-US" smtClean="0"/>
+              <a:t>6/6/2016</a:t>
             </a:fld>
             <a:endParaRPr lang="en-US"/>
           </a:p>
@@ -1936,11 +1916,7 @@
           <a:bodyPr/>
           <a:lstStyle/>
           <a:p>
-            <a:r>
-              <a:rPr lang="en-US" smtClean="0"/>
-              <a:t>https://github.com/StoneyJackson/git-ccscne-2016</a:t>
-            </a:r>
-            <a:endParaRPr lang="en-US"/>
+            <a:endParaRPr lang="en-US" dirty="0"/>
           </a:p>
         </p:txBody>
       </p:sp>
@@ -2156,9 +2132,9 @@
           <a:bodyPr/>
           <a:lstStyle/>
           <a:p>
-            <a:fld id="{9E5C7F82-8054-4214-84B5-500EF282A2AF}" type="datetime1">
-              <a:rPr lang="en-US" smtClean="0"/>
-              <a:t>4/29/2016</a:t>
+            <a:fld id="{09FA5E28-59B3-4DC3-956B-9FB152C1BC05}" type="datetime1">
+              <a:rPr lang="en-US" smtClean="0"/>
+              <a:t>6/6/2016</a:t>
             </a:fld>
             <a:endParaRPr lang="en-US"/>
           </a:p>
@@ -2179,11 +2155,7 @@
           <a:bodyPr/>
           <a:lstStyle/>
           <a:p>
-            <a:r>
-              <a:rPr lang="en-US" smtClean="0"/>
-              <a:t>https://github.com/StoneyJackson/git-ccscne-2016</a:t>
-            </a:r>
-            <a:endParaRPr lang="en-US"/>
+            <a:endParaRPr lang="en-US" dirty="0"/>
           </a:p>
         </p:txBody>
       </p:sp>
@@ -2514,9 +2486,9 @@
           <a:bodyPr/>
           <a:lstStyle/>
           <a:p>
-            <a:fld id="{D9331060-26A9-4D3C-AEE4-A1EF515FF4C6}" type="datetime1">
-              <a:rPr lang="en-US" smtClean="0"/>
-              <a:t>4/29/2016</a:t>
+            <a:fld id="{6F53D323-1CAC-4E82-BB2A-8ED5409FFC7C}" type="datetime1">
+              <a:rPr lang="en-US" smtClean="0"/>
+              <a:t>6/6/2016</a:t>
             </a:fld>
             <a:endParaRPr lang="en-US"/>
           </a:p>
@@ -2537,11 +2509,7 @@
           <a:bodyPr/>
           <a:lstStyle/>
           <a:p>
-            <a:r>
-              <a:rPr lang="en-US" smtClean="0"/>
-              <a:t>https://github.com/StoneyJackson/git-ccscne-2016</a:t>
-            </a:r>
-            <a:endParaRPr lang="en-US"/>
+            <a:endParaRPr lang="en-US" dirty="0"/>
           </a:p>
         </p:txBody>
       </p:sp>
@@ -2643,9 +2611,9 @@
           <a:bodyPr/>
           <a:lstStyle/>
           <a:p>
-            <a:fld id="{368A758D-CBF8-489A-AB85-AC8A24295DB2}" type="datetime1">
-              <a:rPr lang="en-US" smtClean="0"/>
-              <a:t>4/29/2016</a:t>
+            <a:fld id="{4444804C-C846-4F9E-A744-DDD27AF7B023}" type="datetime1">
+              <a:rPr lang="en-US" smtClean="0"/>
+              <a:t>6/6/2016</a:t>
             </a:fld>
             <a:endParaRPr lang="en-US"/>
           </a:p>
@@ -2666,11 +2634,7 @@
           <a:bodyPr/>
           <a:lstStyle/>
           <a:p>
-            <a:r>
-              <a:rPr lang="en-US" smtClean="0"/>
-              <a:t>https://github.com/StoneyJackson/git-ccscne-2016</a:t>
-            </a:r>
-            <a:endParaRPr lang="en-US"/>
+            <a:endParaRPr lang="en-US" dirty="0"/>
           </a:p>
         </p:txBody>
       </p:sp>
@@ -2772,9 +2736,9 @@
           <a:bodyPr/>
           <a:lstStyle/>
           <a:p>
-            <a:fld id="{5A8F6D89-78FE-4F8E-B0B3-EB7C5E9E02FC}" type="datetime1">
-              <a:rPr lang="en-US" smtClean="0"/>
-              <a:t>4/29/2016</a:t>
+            <a:fld id="{4266994C-F133-4678-952F-7A0A2923313C}" type="datetime1">
+              <a:rPr lang="en-US" smtClean="0"/>
+              <a:t>6/6/2016</a:t>
             </a:fld>
             <a:endParaRPr lang="en-US"/>
           </a:p>
@@ -2795,11 +2759,7 @@
           <a:bodyPr/>
           <a:lstStyle/>
           <a:p>
-            <a:r>
-              <a:rPr lang="en-US" smtClean="0"/>
-              <a:t>https://github.com/StoneyJackson/git-ccscne-2016</a:t>
-            </a:r>
-            <a:endParaRPr lang="en-US"/>
+            <a:endParaRPr lang="en-US" dirty="0"/>
           </a:p>
         </p:txBody>
       </p:sp>
@@ -3067,9 +3027,9 @@
           <a:bodyPr/>
           <a:lstStyle/>
           <a:p>
-            <a:fld id="{87B67E50-62A1-453F-B018-13F3A0FBDACC}" type="datetime1">
-              <a:rPr lang="en-US" smtClean="0"/>
-              <a:t>4/29/2016</a:t>
+            <a:fld id="{C64809A3-4844-41E9-82A2-94A6F337D48F}" type="datetime1">
+              <a:rPr lang="en-US" smtClean="0"/>
+              <a:t>6/6/2016</a:t>
             </a:fld>
             <a:endParaRPr lang="en-US"/>
           </a:p>
@@ -3090,11 +3050,7 @@
           <a:bodyPr/>
           <a:lstStyle/>
           <a:p>
-            <a:r>
-              <a:rPr lang="en-US" smtClean="0"/>
-              <a:t>https://github.com/StoneyJackson/git-ccscne-2016</a:t>
-            </a:r>
-            <a:endParaRPr lang="en-US"/>
+            <a:endParaRPr lang="en-US" dirty="0"/>
           </a:p>
         </p:txBody>
       </p:sp>
@@ -3342,9 +3298,9 @@
           <a:bodyPr/>
           <a:lstStyle/>
           <a:p>
-            <a:fld id="{FDA51D3B-4121-4660-9F6B-57C8E95B1064}" type="datetime1">
-              <a:rPr lang="en-US" smtClean="0"/>
-              <a:t>4/29/2016</a:t>
+            <a:fld id="{34AC22AF-0AE9-4FD1-B79D-72A2C78BEA1F}" type="datetime1">
+              <a:rPr lang="en-US" smtClean="0"/>
+              <a:t>6/6/2016</a:t>
             </a:fld>
             <a:endParaRPr lang="en-US"/>
           </a:p>
@@ -3365,11 +3321,7 @@
           <a:bodyPr/>
           <a:lstStyle/>
           <a:p>
-            <a:r>
-              <a:rPr lang="en-US" smtClean="0"/>
-              <a:t>https://github.com/StoneyJackson/git-ccscne-2016</a:t>
-            </a:r>
-            <a:endParaRPr lang="en-US"/>
+            <a:endParaRPr lang="en-US" dirty="0"/>
           </a:p>
         </p:txBody>
       </p:sp>
@@ -3573,9 +3525,9 @@
             </a:lvl1pPr>
           </a:lstStyle>
           <a:p>
-            <a:fld id="{1B7E2B5A-9A4E-410A-AC2D-EDE989808C4A}" type="datetime1">
-              <a:rPr lang="en-US" smtClean="0"/>
-              <a:t>4/29/2016</a:t>
+            <a:fld id="{643D976A-48E0-4A2F-BA6C-64A94F7F9C41}" type="datetime1">
+              <a:rPr lang="en-US" smtClean="0"/>
+              <a:t>6/6/2016</a:t>
             </a:fld>
             <a:endParaRPr lang="en-US"/>
           </a:p>
@@ -3615,10 +3567,6 @@
             </a:lvl1pPr>
           </a:lstStyle>
           <a:p>
-            <a:r>
-              <a:rPr lang="en-US" dirty="0" smtClean="0"/>
-              <a:t>https://github.com/StoneyJackson/git-ccscne-2016</a:t>
-            </a:r>
             <a:endParaRPr lang="en-US" dirty="0"/>
           </a:p>
         </p:txBody>
@@ -3717,7 +3665,7 @@
       </p:par>
     </p:tnLst>
   </p:timing>
-  <p:hf sldNum="0" hdr="0" dt="0"/>
+  <p:hf sldNum="0" hdr="0" ftr="0" dt="0"/>
   <p:txStyles>
     <p:titleStyle>
       <a:lvl1pPr algn="l" defTabSz="914400" rtl="0" eaLnBrk="1" latinLnBrk="0" hangingPunct="1">
@@ -4019,13 +3967,17 @@
         <p:spPr/>
         <p:txBody>
           <a:bodyPr>
-            <a:normAutofit fontScale="90000"/>
+            <a:normAutofit/>
           </a:bodyPr>
           <a:lstStyle/>
           <a:p>
             <a:r>
+              <a:rPr lang="en-US" dirty="0" err="1" smtClean="0"/>
+              <a:t>Git</a:t>
+            </a:r>
+            <a:r>
               <a:rPr lang="en-US" dirty="0" smtClean="0"/>
-              <a:t>Foundations for a Common Workflow to Contribute to HFOSS</a:t>
+              <a:t> Intro Activity</a:t>
             </a:r>
             <a:endParaRPr lang="en-US" dirty="0"/>
           </a:p>
@@ -4067,29 +4019,6 @@
             </a:r>
           </a:p>
           <a:p>
-            <a:endParaRPr lang="en-US" dirty="0"/>
-          </a:p>
-        </p:txBody>
-      </p:sp>
-      <p:sp>
-        <p:nvSpPr>
-          <p:cNvPr id="4" name="Footer Placeholder 3"/>
-          <p:cNvSpPr>
-            <a:spLocks noGrp="1"/>
-          </p:cNvSpPr>
-          <p:nvPr>
-            <p:ph type="ftr" sz="quarter" idx="11"/>
-          </p:nvPr>
-        </p:nvSpPr>
-        <p:spPr/>
-        <p:txBody>
-          <a:bodyPr/>
-          <a:lstStyle/>
-          <a:p>
-            <a:r>
-              <a:rPr lang="en-US" dirty="0" smtClean="0"/>
-              <a:t>https://github.com/StoneyJackson/git-ccscne-2016</a:t>
-            </a:r>
             <a:endParaRPr lang="en-US" dirty="0"/>
           </a:p>
         </p:txBody>
@@ -4141,6 +4070,412 @@
             <p:ph type="title"/>
           </p:nvPr>
         </p:nvSpPr>
+        <p:spPr>
+          <a:xfrm>
+            <a:off x="584824" y="735057"/>
+            <a:ext cx="10515600" cy="1325563"/>
+          </a:xfrm>
+        </p:spPr>
+        <p:txBody>
+          <a:bodyPr/>
+          <a:lstStyle/>
+          <a:p>
+            <a:r>
+              <a:rPr lang="en-US" dirty="0" smtClean="0"/>
+              <a:t>What is </a:t>
+            </a:r>
+            <a:r>
+              <a:rPr lang="en-US" dirty="0" err="1" smtClean="0"/>
+              <a:t>Git</a:t>
+            </a:r>
+            <a:r>
+              <a:rPr lang="en-US" dirty="0" smtClean="0"/>
+              <a:t>?</a:t>
+            </a:r>
+            <a:endParaRPr lang="en-US" dirty="0"/>
+          </a:p>
+        </p:txBody>
+      </p:sp>
+      <p:pic>
+        <p:nvPicPr>
+          <p:cNvPr id="5" name="Content Placeholder 4"/>
+          <p:cNvPicPr>
+            <a:picLocks noGrp="1" noChangeAspect="1"/>
+          </p:cNvPicPr>
+          <p:nvPr>
+            <p:ph idx="1"/>
+          </p:nvPr>
+        </p:nvPicPr>
+        <p:blipFill>
+          <a:blip r:embed="rId2"/>
+          <a:stretch>
+            <a:fillRect/>
+          </a:stretch>
+        </p:blipFill>
+        <p:spPr>
+          <a:xfrm>
+            <a:off x="584824" y="2163650"/>
+            <a:ext cx="9022815" cy="3303072"/>
+          </a:xfrm>
+          <a:prstGeom prst="rect">
+            <a:avLst/>
+          </a:prstGeom>
+        </p:spPr>
+      </p:pic>
+    </p:spTree>
+    <p:extLst>
+      <p:ext uri="{BB962C8B-B14F-4D97-AF65-F5344CB8AC3E}">
+        <p14:creationId xmlns:p14="http://schemas.microsoft.com/office/powerpoint/2010/main" val="3768451308"/>
+      </p:ext>
+    </p:extLst>
+  </p:cSld>
+  <p:clrMapOvr>
+    <a:masterClrMapping/>
+  </p:clrMapOvr>
+  <p:timing>
+    <p:tnLst>
+      <p:par>
+        <p:cTn id="1" dur="indefinite" restart="never" nodeType="tmRoot"/>
+      </p:par>
+    </p:tnLst>
+  </p:timing>
+</p:sld>
+</file>
+
+<file path=ppt/slides/slide3.xml><?xml version="1.0" encoding="utf-8"?>
+<p:sld xmlns:a="http://schemas.openxmlformats.org/drawingml/2006/main" xmlns:r="http://schemas.openxmlformats.org/officeDocument/2006/relationships" xmlns:p="http://schemas.openxmlformats.org/presentationml/2006/main">
+  <p:cSld>
+    <p:spTree>
+      <p:nvGrpSpPr>
+        <p:cNvPr id="1" name=""/>
+        <p:cNvGrpSpPr/>
+        <p:nvPr/>
+      </p:nvGrpSpPr>
+      <p:grpSpPr>
+        <a:xfrm>
+          <a:off x="0" y="0"/>
+          <a:ext cx="0" cy="0"/>
+          <a:chOff x="0" y="0"/>
+          <a:chExt cx="0" cy="0"/>
+        </a:xfrm>
+      </p:grpSpPr>
+      <p:sp>
+        <p:nvSpPr>
+          <p:cNvPr id="2" name="Title 1"/>
+          <p:cNvSpPr>
+            <a:spLocks noGrp="1"/>
+          </p:cNvSpPr>
+          <p:nvPr>
+            <p:ph type="title"/>
+          </p:nvPr>
+        </p:nvSpPr>
+        <p:spPr>
+          <a:xfrm>
+            <a:off x="838200" y="641730"/>
+            <a:ext cx="10515600" cy="1325563"/>
+          </a:xfrm>
+        </p:spPr>
+        <p:txBody>
+          <a:bodyPr/>
+          <a:lstStyle/>
+          <a:p>
+            <a:r>
+              <a:rPr lang="en-US" dirty="0" smtClean="0"/>
+              <a:t>What is </a:t>
+            </a:r>
+            <a:r>
+              <a:rPr lang="en-US" dirty="0" err="1"/>
+              <a:t>G</a:t>
+            </a:r>
+            <a:r>
+              <a:rPr lang="en-US" dirty="0" err="1" smtClean="0"/>
+              <a:t>it</a:t>
+            </a:r>
+            <a:r>
+              <a:rPr lang="en-US" dirty="0" smtClean="0"/>
+              <a:t>?</a:t>
+            </a:r>
+            <a:endParaRPr lang="en-US" dirty="0"/>
+          </a:p>
+        </p:txBody>
+      </p:sp>
+      <p:sp>
+        <p:nvSpPr>
+          <p:cNvPr id="3" name="Content Placeholder 2"/>
+          <p:cNvSpPr>
+            <a:spLocks noGrp="1"/>
+          </p:cNvSpPr>
+          <p:nvPr>
+            <p:ph idx="1"/>
+          </p:nvPr>
+        </p:nvSpPr>
+        <p:spPr>
+          <a:xfrm>
+            <a:off x="838200" y="1967293"/>
+            <a:ext cx="10515600" cy="4351338"/>
+          </a:xfrm>
+        </p:spPr>
+        <p:txBody>
+          <a:bodyPr>
+            <a:normAutofit/>
+          </a:bodyPr>
+          <a:lstStyle/>
+          <a:p>
+            <a:r>
+              <a:rPr lang="en-US" sz="3600" dirty="0" err="1" smtClean="0"/>
+              <a:t>Git</a:t>
+            </a:r>
+            <a:r>
+              <a:rPr lang="en-US" sz="3600" dirty="0" smtClean="0"/>
+              <a:t> is a version control system</a:t>
+            </a:r>
+          </a:p>
+          <a:p>
+            <a:r>
+              <a:rPr lang="en-US" sz="3600" dirty="0" smtClean="0"/>
+              <a:t>It allows you to keep track of changes to a set of files over time</a:t>
+            </a:r>
+          </a:p>
+          <a:p>
+            <a:r>
+              <a:rPr lang="en-US" sz="3600" dirty="0" smtClean="0"/>
+              <a:t>You can also revert back to the previous state of a file</a:t>
+            </a:r>
+            <a:endParaRPr lang="en-US" sz="3600" dirty="0"/>
+          </a:p>
+        </p:txBody>
+      </p:sp>
+    </p:spTree>
+    <p:extLst>
+      <p:ext uri="{BB962C8B-B14F-4D97-AF65-F5344CB8AC3E}">
+        <p14:creationId xmlns:p14="http://schemas.microsoft.com/office/powerpoint/2010/main" val="919355635"/>
+      </p:ext>
+    </p:extLst>
+  </p:cSld>
+  <p:clrMapOvr>
+    <a:masterClrMapping/>
+  </p:clrMapOvr>
+  <p:timing>
+    <p:tnLst>
+      <p:par>
+        <p:cTn id="1" dur="indefinite" restart="never" nodeType="tmRoot"/>
+      </p:par>
+    </p:tnLst>
+  </p:timing>
+</p:sld>
+</file>
+
+<file path=ppt/slides/slide4.xml><?xml version="1.0" encoding="utf-8"?>
+<p:sld xmlns:a="http://schemas.openxmlformats.org/drawingml/2006/main" xmlns:r="http://schemas.openxmlformats.org/officeDocument/2006/relationships" xmlns:p="http://schemas.openxmlformats.org/presentationml/2006/main">
+  <p:cSld>
+    <p:spTree>
+      <p:nvGrpSpPr>
+        <p:cNvPr id="1" name=""/>
+        <p:cNvGrpSpPr/>
+        <p:nvPr/>
+      </p:nvGrpSpPr>
+      <p:grpSpPr>
+        <a:xfrm>
+          <a:off x="0" y="0"/>
+          <a:ext cx="0" cy="0"/>
+          <a:chOff x="0" y="0"/>
+          <a:chExt cx="0" cy="0"/>
+        </a:xfrm>
+      </p:grpSpPr>
+      <p:sp>
+        <p:nvSpPr>
+          <p:cNvPr id="2" name="Title 1"/>
+          <p:cNvSpPr>
+            <a:spLocks noGrp="1"/>
+          </p:cNvSpPr>
+          <p:nvPr>
+            <p:ph type="title"/>
+          </p:nvPr>
+        </p:nvSpPr>
+        <p:spPr>
+          <a:xfrm>
+            <a:off x="838200" y="641730"/>
+            <a:ext cx="10515600" cy="1325563"/>
+          </a:xfrm>
+        </p:spPr>
+        <p:txBody>
+          <a:bodyPr/>
+          <a:lstStyle/>
+          <a:p>
+            <a:r>
+              <a:rPr lang="en-US" dirty="0" smtClean="0"/>
+              <a:t>Team Formation</a:t>
+            </a:r>
+            <a:endParaRPr lang="en-US" dirty="0"/>
+          </a:p>
+        </p:txBody>
+      </p:sp>
+      <p:sp>
+        <p:nvSpPr>
+          <p:cNvPr id="3" name="Content Placeholder 2"/>
+          <p:cNvSpPr>
+            <a:spLocks noGrp="1"/>
+          </p:cNvSpPr>
+          <p:nvPr>
+            <p:ph idx="1"/>
+          </p:nvPr>
+        </p:nvSpPr>
+        <p:spPr>
+          <a:xfrm>
+            <a:off x="838200" y="1967293"/>
+            <a:ext cx="10515600" cy="4351338"/>
+          </a:xfrm>
+        </p:spPr>
+        <p:txBody>
+          <a:bodyPr>
+            <a:normAutofit/>
+          </a:bodyPr>
+          <a:lstStyle/>
+          <a:p>
+            <a:r>
+              <a:rPr lang="en-US" sz="3600" dirty="0" smtClean="0"/>
+              <a:t>Roles:</a:t>
+            </a:r>
+          </a:p>
+          <a:p>
+            <a:pPr lvl="1"/>
+            <a:r>
+              <a:rPr lang="en-US" sz="3200" dirty="0" smtClean="0"/>
+              <a:t>Driver</a:t>
+            </a:r>
+            <a:r>
+              <a:rPr lang="en-US" sz="3200" dirty="0"/>
+              <a:t>: Creates and maintains a local </a:t>
+            </a:r>
+            <a:r>
+              <a:rPr lang="en-US" sz="3200" dirty="0" err="1"/>
+              <a:t>git</a:t>
+            </a:r>
+            <a:r>
+              <a:rPr lang="en-US" sz="3200" dirty="0"/>
+              <a:t> </a:t>
+            </a:r>
+            <a:r>
+              <a:rPr lang="en-US" sz="3200" dirty="0" smtClean="0"/>
+              <a:t>repository</a:t>
+            </a:r>
+            <a:endParaRPr lang="en-US" sz="3200" dirty="0"/>
+          </a:p>
+          <a:p>
+            <a:pPr lvl="1"/>
+            <a:r>
+              <a:rPr lang="en-US" sz="3200" dirty="0"/>
+              <a:t>Navigator: Ensures that the team </a:t>
+            </a:r>
+            <a:r>
+              <a:rPr lang="en-US" sz="3200" dirty="0" smtClean="0"/>
+              <a:t>is following </a:t>
+            </a:r>
+            <a:r>
+              <a:rPr lang="en-US" sz="3200" dirty="0"/>
+              <a:t>the </a:t>
+            </a:r>
+            <a:r>
+              <a:rPr lang="en-US" sz="3200" dirty="0" smtClean="0"/>
+              <a:t>activity</a:t>
+            </a:r>
+            <a:endParaRPr lang="en-US" sz="3200" dirty="0"/>
+          </a:p>
+          <a:p>
+            <a:pPr lvl="1"/>
+            <a:r>
+              <a:rPr lang="en-US" sz="3200" dirty="0"/>
+              <a:t>Recorder: Records all answers and </a:t>
+            </a:r>
+            <a:r>
+              <a:rPr lang="en-US" sz="3200" dirty="0" smtClean="0"/>
+              <a:t>questions</a:t>
+            </a:r>
+            <a:endParaRPr lang="en-US" sz="3200" dirty="0"/>
+          </a:p>
+          <a:p>
+            <a:r>
+              <a:rPr lang="en-US" sz="3600" dirty="0" smtClean="0"/>
+              <a:t>For teams of 2, combine the navigator and recorder roles</a:t>
+            </a:r>
+            <a:endParaRPr lang="en-US" sz="3600" dirty="0" smtClean="0"/>
+          </a:p>
+          <a:p>
+            <a:r>
+              <a:rPr lang="en-US" sz="3600" dirty="0" smtClean="0"/>
+              <a:t>Record answers to questions on a </a:t>
+            </a:r>
+            <a:r>
+              <a:rPr lang="en-US" sz="3600" dirty="0" err="1" smtClean="0"/>
+              <a:t>titanpad</a:t>
+            </a:r>
+            <a:r>
+              <a:rPr lang="en-US" sz="3600" dirty="0" smtClean="0"/>
+              <a:t>; use your first names, </a:t>
+            </a:r>
+            <a:r>
+              <a:rPr lang="en-US" sz="3600" smtClean="0"/>
+              <a:t>for example, </a:t>
+            </a:r>
+            <a:r>
+              <a:rPr lang="en-US" sz="3600" dirty="0" smtClean="0"/>
+              <a:t>titanpad.com/</a:t>
+            </a:r>
+            <a:r>
+              <a:rPr lang="en-US" sz="3600" dirty="0" err="1" smtClean="0"/>
+              <a:t>JoeMarySue</a:t>
+            </a:r>
+            <a:endParaRPr lang="en-US" sz="3600" dirty="0" smtClean="0"/>
+          </a:p>
+        </p:txBody>
+      </p:sp>
+    </p:spTree>
+    <p:extLst>
+      <p:ext uri="{BB962C8B-B14F-4D97-AF65-F5344CB8AC3E}">
+        <p14:creationId xmlns:p14="http://schemas.microsoft.com/office/powerpoint/2010/main" val="88541939"/>
+      </p:ext>
+    </p:extLst>
+  </p:cSld>
+  <p:clrMapOvr>
+    <a:masterClrMapping/>
+  </p:clrMapOvr>
+  <p:timing>
+    <p:tnLst>
+      <p:par>
+        <p:cTn id="1" dur="indefinite" restart="never" nodeType="tmRoot"/>
+      </p:par>
+    </p:tnLst>
+  </p:timing>
+</p:sld>
+</file>
+
+<file path=ppt/slides/slide5.xml><?xml version="1.0" encoding="utf-8"?>
+<p:sld xmlns:a="http://schemas.openxmlformats.org/drawingml/2006/main" xmlns:r="http://schemas.openxmlformats.org/officeDocument/2006/relationships" xmlns:p="http://schemas.openxmlformats.org/presentationml/2006/main">
+  <p:cSld>
+    <p:spTree>
+      <p:nvGrpSpPr>
+        <p:cNvPr id="1" name=""/>
+        <p:cNvGrpSpPr/>
+        <p:nvPr/>
+      </p:nvGrpSpPr>
+      <p:grpSpPr>
+        <a:xfrm>
+          <a:off x="0" y="0"/>
+          <a:ext cx="0" cy="0"/>
+          <a:chOff x="0" y="0"/>
+          <a:chExt cx="0" cy="0"/>
+        </a:xfrm>
+      </p:grpSpPr>
+      <p:sp>
+        <p:nvSpPr>
+          <p:cNvPr id="2" name="Title 1"/>
+          <p:cNvSpPr>
+            <a:spLocks noGrp="1"/>
+          </p:cNvSpPr>
+          <p:nvPr>
+            <p:ph type="title"/>
+          </p:nvPr>
+        </p:nvSpPr>
         <p:spPr/>
         <p:txBody>
           <a:bodyPr/>
@@ -4148,7 +4483,11 @@
           <a:p>
             <a:r>
               <a:rPr lang="en-US" dirty="0" smtClean="0"/>
-              <a:t>Acknowledgement and Licensing</a:t>
+              <a:t>Who we are – fo</a:t>
+            </a:r>
+            <a:r>
+              <a:rPr lang="en-US" dirty="0" smtClean="0"/>
+              <a:t>ss2serve.org</a:t>
             </a:r>
             <a:endParaRPr lang="en-US" dirty="0"/>
           </a:p>
@@ -4198,11 +4537,7 @@
           <a:p>
             <a:r>
               <a:rPr lang="en-US" dirty="0" smtClean="0"/>
-              <a:t>Copyright </a:t>
-            </a:r>
-            <a:r>
-              <a:rPr lang="en-US" dirty="0" smtClean="0"/>
-              <a:t>and Licensing</a:t>
+              <a:t>Copyright and Licensing</a:t>
             </a:r>
           </a:p>
           <a:p>
@@ -4400,29 +4735,6 @@
           </a:extLst>
         </p:spPr>
       </p:pic>
-      <p:sp>
-        <p:nvSpPr>
-          <p:cNvPr id="4" name="Footer Placeholder 3"/>
-          <p:cNvSpPr>
-            <a:spLocks noGrp="1"/>
-          </p:cNvSpPr>
-          <p:nvPr>
-            <p:ph type="ftr" sz="quarter" idx="11"/>
-          </p:nvPr>
-        </p:nvSpPr>
-        <p:spPr/>
-        <p:txBody>
-          <a:bodyPr/>
-          <a:lstStyle/>
-          <a:p>
-            <a:r>
-              <a:rPr lang="en-US" smtClean="0"/>
-              <a:t>https://github.com/StoneyJackson/git-ccscne-2016</a:t>
-            </a:r>
-            <a:endParaRPr lang="en-US"/>
-          </a:p>
-        </p:txBody>
-      </p:sp>
     </p:spTree>
     <p:extLst>
       <p:ext uri="{BB962C8B-B14F-4D97-AF65-F5344CB8AC3E}">
@@ -4440,412 +4752,6 @@
       </p:par>
     </p:tnLst>
   </p:timing>
-</p:sld>
-</file>
-
-<file path=ppt/slides/slide3.xml><?xml version="1.0" encoding="utf-8"?>
-<p:sld xmlns:a="http://schemas.openxmlformats.org/drawingml/2006/main" xmlns:r="http://schemas.openxmlformats.org/officeDocument/2006/relationships" xmlns:p="http://schemas.openxmlformats.org/presentationml/2006/main">
-  <p:cSld>
-    <p:spTree>
-      <p:nvGrpSpPr>
-        <p:cNvPr id="1" name=""/>
-        <p:cNvGrpSpPr/>
-        <p:nvPr/>
-      </p:nvGrpSpPr>
-      <p:grpSpPr>
-        <a:xfrm>
-          <a:off x="0" y="0"/>
-          <a:ext cx="0" cy="0"/>
-          <a:chOff x="0" y="0"/>
-          <a:chExt cx="0" cy="0"/>
-        </a:xfrm>
-      </p:grpSpPr>
-      <p:sp>
-        <p:nvSpPr>
-          <p:cNvPr id="2" name="Title 1"/>
-          <p:cNvSpPr>
-            <a:spLocks noGrp="1"/>
-          </p:cNvSpPr>
-          <p:nvPr>
-            <p:ph type="title"/>
-          </p:nvPr>
-        </p:nvSpPr>
-        <p:spPr>
-          <a:xfrm>
-            <a:off x="584824" y="735057"/>
-            <a:ext cx="10515600" cy="1325563"/>
-          </a:xfrm>
-        </p:spPr>
-        <p:txBody>
-          <a:bodyPr/>
-          <a:lstStyle/>
-          <a:p>
-            <a:r>
-              <a:rPr lang="en-US" dirty="0" smtClean="0"/>
-              <a:t>What is </a:t>
-            </a:r>
-            <a:r>
-              <a:rPr lang="en-US" dirty="0" err="1" smtClean="0"/>
-              <a:t>G</a:t>
-            </a:r>
-            <a:r>
-              <a:rPr lang="en-US" dirty="0" err="1" smtClean="0"/>
-              <a:t>it</a:t>
-            </a:r>
-            <a:r>
-              <a:rPr lang="en-US" dirty="0" smtClean="0"/>
-              <a:t>?</a:t>
-            </a:r>
-            <a:endParaRPr lang="en-US" dirty="0"/>
-          </a:p>
-        </p:txBody>
-      </p:sp>
-      <p:pic>
-        <p:nvPicPr>
-          <p:cNvPr id="5" name="Content Placeholder 4"/>
-          <p:cNvPicPr>
-            <a:picLocks noGrp="1" noChangeAspect="1"/>
-          </p:cNvPicPr>
-          <p:nvPr>
-            <p:ph idx="1"/>
-          </p:nvPr>
-        </p:nvPicPr>
-        <p:blipFill>
-          <a:blip r:embed="rId2"/>
-          <a:stretch>
-            <a:fillRect/>
-          </a:stretch>
-        </p:blipFill>
-        <p:spPr>
-          <a:xfrm>
-            <a:off x="584824" y="2163650"/>
-            <a:ext cx="9022815" cy="3303072"/>
-          </a:xfrm>
-          <a:prstGeom prst="rect">
-            <a:avLst/>
-          </a:prstGeom>
-        </p:spPr>
-      </p:pic>
-      <p:sp>
-        <p:nvSpPr>
-          <p:cNvPr id="3" name="Footer Placeholder 2"/>
-          <p:cNvSpPr>
-            <a:spLocks noGrp="1"/>
-          </p:cNvSpPr>
-          <p:nvPr>
-            <p:ph type="ftr" sz="quarter" idx="11"/>
-          </p:nvPr>
-        </p:nvSpPr>
-        <p:spPr/>
-        <p:txBody>
-          <a:bodyPr/>
-          <a:lstStyle/>
-          <a:p>
-            <a:r>
-              <a:rPr lang="en-US" smtClean="0"/>
-              <a:t>https://github.com/StoneyJackson/git-ccscne-2016</a:t>
-            </a:r>
-            <a:endParaRPr lang="en-US"/>
-          </a:p>
-        </p:txBody>
-      </p:sp>
-    </p:spTree>
-    <p:extLst>
-      <p:ext uri="{BB962C8B-B14F-4D97-AF65-F5344CB8AC3E}">
-        <p14:creationId xmlns:p14="http://schemas.microsoft.com/office/powerpoint/2010/main" val="3768451308"/>
-      </p:ext>
-    </p:extLst>
-  </p:cSld>
-  <p:clrMapOvr>
-    <a:masterClrMapping/>
-  </p:clrMapOvr>
-  <p:timing>
-    <p:tnLst>
-      <p:par>
-        <p:cTn id="1" dur="indefinite" restart="never" nodeType="tmRoot"/>
-      </p:par>
-    </p:tnLst>
-  </p:timing>
-</p:sld>
-</file>
-
-<file path=ppt/slides/slide4.xml><?xml version="1.0" encoding="utf-8"?>
-<p:sld xmlns:a="http://schemas.openxmlformats.org/drawingml/2006/main" xmlns:r="http://schemas.openxmlformats.org/officeDocument/2006/relationships" xmlns:p="http://schemas.openxmlformats.org/presentationml/2006/main">
-  <p:cSld>
-    <p:spTree>
-      <p:nvGrpSpPr>
-        <p:cNvPr id="1" name=""/>
-        <p:cNvGrpSpPr/>
-        <p:nvPr/>
-      </p:nvGrpSpPr>
-      <p:grpSpPr>
-        <a:xfrm>
-          <a:off x="0" y="0"/>
-          <a:ext cx="0" cy="0"/>
-          <a:chOff x="0" y="0"/>
-          <a:chExt cx="0" cy="0"/>
-        </a:xfrm>
-      </p:grpSpPr>
-      <p:sp>
-        <p:nvSpPr>
-          <p:cNvPr id="2" name="Title 1"/>
-          <p:cNvSpPr>
-            <a:spLocks noGrp="1"/>
-          </p:cNvSpPr>
-          <p:nvPr>
-            <p:ph type="title"/>
-          </p:nvPr>
-        </p:nvSpPr>
-        <p:spPr>
-          <a:xfrm>
-            <a:off x="838200" y="641730"/>
-            <a:ext cx="10515600" cy="1325563"/>
-          </a:xfrm>
-        </p:spPr>
-        <p:txBody>
-          <a:bodyPr/>
-          <a:lstStyle/>
-          <a:p>
-            <a:r>
-              <a:rPr lang="en-US" dirty="0" smtClean="0"/>
-              <a:t>What is </a:t>
-            </a:r>
-            <a:r>
-              <a:rPr lang="en-US" dirty="0" err="1"/>
-              <a:t>G</a:t>
-            </a:r>
-            <a:r>
-              <a:rPr lang="en-US" dirty="0" err="1" smtClean="0"/>
-              <a:t>it</a:t>
-            </a:r>
-            <a:r>
-              <a:rPr lang="en-US" dirty="0" smtClean="0"/>
-              <a:t>?</a:t>
-            </a:r>
-            <a:endParaRPr lang="en-US" dirty="0"/>
-          </a:p>
-        </p:txBody>
-      </p:sp>
-      <p:sp>
-        <p:nvSpPr>
-          <p:cNvPr id="3" name="Content Placeholder 2"/>
-          <p:cNvSpPr>
-            <a:spLocks noGrp="1"/>
-          </p:cNvSpPr>
-          <p:nvPr>
-            <p:ph idx="1"/>
-          </p:nvPr>
-        </p:nvSpPr>
-        <p:spPr>
-          <a:xfrm>
-            <a:off x="838200" y="1967293"/>
-            <a:ext cx="10515600" cy="4351338"/>
-          </a:xfrm>
-        </p:spPr>
-        <p:txBody>
-          <a:bodyPr>
-            <a:normAutofit/>
-          </a:bodyPr>
-          <a:lstStyle/>
-          <a:p>
-            <a:r>
-              <a:rPr lang="en-US" sz="3600" dirty="0" err="1" smtClean="0"/>
-              <a:t>Git</a:t>
-            </a:r>
-            <a:r>
-              <a:rPr lang="en-US" sz="3600" dirty="0" smtClean="0"/>
-              <a:t> is a version control system</a:t>
-            </a:r>
-          </a:p>
-          <a:p>
-            <a:r>
-              <a:rPr lang="en-US" sz="3600" dirty="0" smtClean="0"/>
-              <a:t>It allows you to keep track of changes to a set of files over time</a:t>
-            </a:r>
-          </a:p>
-          <a:p>
-            <a:r>
-              <a:rPr lang="en-US" sz="3600" dirty="0" smtClean="0"/>
-              <a:t>You can also revert back to the previous state of a file</a:t>
-            </a:r>
-            <a:endParaRPr lang="en-US" sz="3600" dirty="0"/>
-          </a:p>
-        </p:txBody>
-      </p:sp>
-      <p:sp>
-        <p:nvSpPr>
-          <p:cNvPr id="4" name="Footer Placeholder 3"/>
-          <p:cNvSpPr>
-            <a:spLocks noGrp="1"/>
-          </p:cNvSpPr>
-          <p:nvPr>
-            <p:ph type="ftr" sz="quarter" idx="11"/>
-          </p:nvPr>
-        </p:nvSpPr>
-        <p:spPr/>
-        <p:txBody>
-          <a:bodyPr/>
-          <a:lstStyle/>
-          <a:p>
-            <a:r>
-              <a:rPr lang="en-US" smtClean="0"/>
-              <a:t>https://github.com/StoneyJackson/git-ccscne-2016</a:t>
-            </a:r>
-            <a:endParaRPr lang="en-US"/>
-          </a:p>
-        </p:txBody>
-      </p:sp>
-    </p:spTree>
-    <p:extLst>
-      <p:ext uri="{BB962C8B-B14F-4D97-AF65-F5344CB8AC3E}">
-        <p14:creationId xmlns:p14="http://schemas.microsoft.com/office/powerpoint/2010/main" val="919355635"/>
-      </p:ext>
-    </p:extLst>
-  </p:cSld>
-  <p:clrMapOvr>
-    <a:masterClrMapping/>
-  </p:clrMapOvr>
-  <p:timing>
-    <p:tnLst>
-      <p:par>
-        <p:cTn id="1" dur="indefinite" restart="never" nodeType="tmRoot"/>
-      </p:par>
-    </p:tnLst>
-  </p:timing>
-</p:sld>
-</file>
-
-<file path=ppt/slides/slide5.xml><?xml version="1.0" encoding="utf-8"?>
-<p:sld xmlns:a="http://schemas.openxmlformats.org/drawingml/2006/main" xmlns:r="http://schemas.openxmlformats.org/officeDocument/2006/relationships" xmlns:p="http://schemas.openxmlformats.org/presentationml/2006/main">
-  <p:cSld>
-    <p:spTree>
-      <p:nvGrpSpPr>
-        <p:cNvPr id="1" name=""/>
-        <p:cNvGrpSpPr/>
-        <p:nvPr/>
-      </p:nvGrpSpPr>
-      <p:grpSpPr>
-        <a:xfrm>
-          <a:off x="0" y="0"/>
-          <a:ext cx="0" cy="0"/>
-          <a:chOff x="0" y="0"/>
-          <a:chExt cx="0" cy="0"/>
-        </a:xfrm>
-      </p:grpSpPr>
-      <p:sp>
-        <p:nvSpPr>
-          <p:cNvPr id="2" name="Title 1"/>
-          <p:cNvSpPr>
-            <a:spLocks noGrp="1"/>
-          </p:cNvSpPr>
-          <p:nvPr>
-            <p:ph type="title"/>
-          </p:nvPr>
-        </p:nvSpPr>
-        <p:spPr/>
-        <p:txBody>
-          <a:bodyPr/>
-          <a:lstStyle/>
-          <a:p>
-            <a:r>
-              <a:rPr lang="en-US" dirty="0" smtClean="0"/>
-              <a:t>Resources</a:t>
-            </a:r>
-            <a:endParaRPr lang="en-US" dirty="0"/>
-          </a:p>
-        </p:txBody>
-      </p:sp>
-      <p:sp>
-        <p:nvSpPr>
-          <p:cNvPr id="3" name="Content Placeholder 2"/>
-          <p:cNvSpPr>
-            <a:spLocks noGrp="1"/>
-          </p:cNvSpPr>
-          <p:nvPr>
-            <p:ph idx="1"/>
-          </p:nvPr>
-        </p:nvSpPr>
-        <p:spPr/>
-        <p:txBody>
-          <a:bodyPr/>
-          <a:lstStyle/>
-          <a:p>
-            <a:r>
-              <a:rPr lang="en-US" dirty="0" smtClean="0">
-                <a:hlinkClick r:id="rId2"/>
-              </a:rPr>
-              <a:t>http</a:t>
-            </a:r>
-            <a:r>
-              <a:rPr lang="en-US" dirty="0">
-                <a:hlinkClick r:id="rId2"/>
-              </a:rPr>
-              <a:t>://</a:t>
-            </a:r>
-            <a:r>
-              <a:rPr lang="en-US" dirty="0" smtClean="0">
-                <a:hlinkClick r:id="rId2"/>
-              </a:rPr>
-              <a:t>foss2serve.org</a:t>
-            </a:r>
-            <a:endParaRPr lang="en-US" dirty="0" smtClean="0"/>
-          </a:p>
-          <a:p>
-            <a:pPr marL="0" indent="0">
-              <a:buNone/>
-            </a:pPr>
-            <a:endParaRPr lang="en-US" dirty="0" smtClean="0"/>
-          </a:p>
-          <a:p>
-            <a:r>
-              <a:rPr lang="en-US" dirty="0"/>
-              <a:t>https://github.com/StoneyJackson/git-ccscne-2016</a:t>
-            </a:r>
-          </a:p>
-          <a:p>
-            <a:pPr marL="0" indent="0">
-              <a:buNone/>
-            </a:pPr>
-            <a:endParaRPr lang="en-US" dirty="0" smtClean="0"/>
-          </a:p>
-          <a:p>
-            <a:endParaRPr lang="en-US" dirty="0"/>
-          </a:p>
-        </p:txBody>
-      </p:sp>
-      <p:sp>
-        <p:nvSpPr>
-          <p:cNvPr id="4" name="Footer Placeholder 3"/>
-          <p:cNvSpPr>
-            <a:spLocks noGrp="1"/>
-          </p:cNvSpPr>
-          <p:nvPr>
-            <p:ph type="ftr" sz="quarter" idx="11"/>
-          </p:nvPr>
-        </p:nvSpPr>
-        <p:spPr/>
-        <p:txBody>
-          <a:bodyPr/>
-          <a:lstStyle/>
-          <a:p>
-            <a:r>
-              <a:rPr lang="en-US" smtClean="0"/>
-              <a:t>https://github.com/StoneyJackson/git-ccscne-2016</a:t>
-            </a:r>
-            <a:endParaRPr lang="en-US"/>
-          </a:p>
-        </p:txBody>
-      </p:sp>
-    </p:spTree>
-    <p:extLst>
-      <p:ext uri="{BB962C8B-B14F-4D97-AF65-F5344CB8AC3E}">
-        <p14:creationId xmlns:p14="http://schemas.microsoft.com/office/powerpoint/2010/main" val="2444244580"/>
-      </p:ext>
-    </p:extLst>
-  </p:cSld>
-  <p:clrMapOvr>
-    <a:masterClrMapping/>
-  </p:clrMapOvr>
 </p:sld>
 </file>
 

</xml_diff>

<commit_message>
License stuff and tighten up README.md
</commit_message>
<xml_diff>
--- a/presentation.pptx
+++ b/presentation.pptx
@@ -113,7 +113,7 @@
   </p:defaultTextStyle>
   <p:extLst>
     <p:ext uri="{EFAFB233-063F-42B5-8137-9DF3F51BA10A}">
-      <p15:sldGuideLst xmlns:p15="http://schemas.microsoft.com/office/powerpoint/2012/main"/>
+      <p15:sldGuideLst xmlns:p15="http://schemas.microsoft.com/office/powerpoint/2012/main" xmlns=""/>
     </p:ext>
   </p:extLst>
 </p:presentation>
@@ -201,7 +201,7 @@
           <a:p>
             <a:fld id="{88ADF0C9-B6B3-4E32-BBBC-1AAF884BB291}" type="datetimeFigureOut">
               <a:rPr lang="en-US" smtClean="0"/>
-              <a:t>6/6/2016</a:t>
+              <a:t>6/6/16</a:t>
             </a:fld>
             <a:endParaRPr lang="en-US"/>
           </a:p>
@@ -779,7 +779,7 @@
           <a:p>
             <a:fld id="{2B5F910F-0D88-44E7-9D16-729126A4368A}" type="datetime1">
               <a:rPr lang="en-US" smtClean="0"/>
-              <a:t>6/6/2016</a:t>
+              <a:t>6/6/16</a:t>
             </a:fld>
             <a:endParaRPr lang="en-US" dirty="0"/>
           </a:p>
@@ -841,7 +841,7 @@
   <p:timing>
     <p:tnLst>
       <p:par>
-        <p:cTn id="1" dur="indefinite" restart="never" nodeType="tmRoot"/>
+        <p:cTn xmlns:p14="http://schemas.microsoft.com/office/powerpoint/2010/main" id="1" dur="indefinite" restart="never" nodeType="tmRoot"/>
       </p:par>
     </p:tnLst>
   </p:timing>
@@ -957,7 +957,7 @@
           <a:p>
             <a:fld id="{9CF3F760-62F5-417C-B9F2-8B4B78CC9BCD}" type="datetime1">
               <a:rPr lang="en-US" smtClean="0"/>
-              <a:t>6/6/2016</a:t>
+              <a:t>6/6/16</a:t>
             </a:fld>
             <a:endParaRPr lang="en-US"/>
           </a:p>
@@ -1018,7 +1018,7 @@
   <p:timing>
     <p:tnLst>
       <p:par>
-        <p:cTn id="1" dur="indefinite" restart="never" nodeType="tmRoot"/>
+        <p:cTn xmlns:p14="http://schemas.microsoft.com/office/powerpoint/2010/main" id="1" dur="indefinite" restart="never" nodeType="tmRoot"/>
       </p:par>
     </p:tnLst>
   </p:timing>
@@ -1144,7 +1144,7 @@
           <a:p>
             <a:fld id="{8E7C9C65-3AA0-4851-8075-1EB08FC69F4E}" type="datetime1">
               <a:rPr lang="en-US" smtClean="0"/>
-              <a:t>6/6/2016</a:t>
+              <a:t>6/6/16</a:t>
             </a:fld>
             <a:endParaRPr lang="en-US"/>
           </a:p>
@@ -1205,7 +1205,7 @@
   <p:timing>
     <p:tnLst>
       <p:par>
-        <p:cTn id="1" dur="indefinite" restart="never" nodeType="tmRoot"/>
+        <p:cTn xmlns:p14="http://schemas.microsoft.com/office/powerpoint/2010/main" id="1" dur="indefinite" restart="never" nodeType="tmRoot"/>
       </p:par>
     </p:tnLst>
   </p:timing>
@@ -1408,7 +1408,7 @@
           <a:p>
             <a:fld id="{EC366BEE-34BB-4E8F-AB0B-A88608F1D06F}" type="datetime1">
               <a:rPr lang="en-US" smtClean="0"/>
-              <a:t>6/6/2016</a:t>
+              <a:t>6/6/16</a:t>
             </a:fld>
             <a:endParaRPr lang="en-US" dirty="0"/>
           </a:p>
@@ -1521,7 +1521,7 @@
   <p:timing>
     <p:tnLst>
       <p:par>
-        <p:cTn id="1" dur="indefinite" restart="never" nodeType="tmRoot"/>
+        <p:cTn xmlns:p14="http://schemas.microsoft.com/office/powerpoint/2010/main" id="1" dur="indefinite" restart="never" nodeType="tmRoot"/>
       </p:par>
     </p:tnLst>
   </p:timing>
@@ -1637,7 +1637,7 @@
           <a:p>
             <a:fld id="{269941EC-57CC-43A3-9CD2-BCDE132CB878}" type="datetime1">
               <a:rPr lang="en-US" smtClean="0"/>
-              <a:t>6/6/2016</a:t>
+              <a:t>6/6/16</a:t>
             </a:fld>
             <a:endParaRPr lang="en-US"/>
           </a:p>
@@ -1698,7 +1698,7 @@
   <p:timing>
     <p:tnLst>
       <p:par>
-        <p:cTn id="1" dur="indefinite" restart="never" nodeType="tmRoot"/>
+        <p:cTn xmlns:p14="http://schemas.microsoft.com/office/powerpoint/2010/main" id="1" dur="indefinite" restart="never" nodeType="tmRoot"/>
       </p:par>
     </p:tnLst>
   </p:timing>
@@ -1895,7 +1895,7 @@
           <a:p>
             <a:fld id="{70D58B8C-9D91-411E-9226-EACD3B4EF0B1}" type="datetime1">
               <a:rPr lang="en-US" smtClean="0"/>
-              <a:t>6/6/2016</a:t>
+              <a:t>6/6/16</a:t>
             </a:fld>
             <a:endParaRPr lang="en-US"/>
           </a:p>
@@ -1956,7 +1956,7 @@
   <p:timing>
     <p:tnLst>
       <p:par>
-        <p:cTn id="1" dur="indefinite" restart="never" nodeType="tmRoot"/>
+        <p:cTn xmlns:p14="http://schemas.microsoft.com/office/powerpoint/2010/main" id="1" dur="indefinite" restart="never" nodeType="tmRoot"/>
       </p:par>
     </p:tnLst>
   </p:timing>
@@ -2134,7 +2134,7 @@
           <a:p>
             <a:fld id="{09FA5E28-59B3-4DC3-956B-9FB152C1BC05}" type="datetime1">
               <a:rPr lang="en-US" smtClean="0"/>
-              <a:t>6/6/2016</a:t>
+              <a:t>6/6/16</a:t>
             </a:fld>
             <a:endParaRPr lang="en-US"/>
           </a:p>
@@ -2195,7 +2195,7 @@
   <p:timing>
     <p:tnLst>
       <p:par>
-        <p:cTn id="1" dur="indefinite" restart="never" nodeType="tmRoot"/>
+        <p:cTn xmlns:p14="http://schemas.microsoft.com/office/powerpoint/2010/main" id="1" dur="indefinite" restart="never" nodeType="tmRoot"/>
       </p:par>
     </p:tnLst>
   </p:timing>
@@ -2488,7 +2488,7 @@
           <a:p>
             <a:fld id="{6F53D323-1CAC-4E82-BB2A-8ED5409FFC7C}" type="datetime1">
               <a:rPr lang="en-US" smtClean="0"/>
-              <a:t>6/6/2016</a:t>
+              <a:t>6/6/16</a:t>
             </a:fld>
             <a:endParaRPr lang="en-US"/>
           </a:p>
@@ -2572,7 +2572,7 @@
   <p:timing>
     <p:tnLst>
       <p:par>
-        <p:cTn id="1" dur="indefinite" restart="never" nodeType="tmRoot"/>
+        <p:cTn xmlns:p14="http://schemas.microsoft.com/office/powerpoint/2010/main" id="1" dur="indefinite" restart="never" nodeType="tmRoot"/>
       </p:par>
     </p:tnLst>
   </p:timing>
@@ -2613,7 +2613,7 @@
           <a:p>
             <a:fld id="{4444804C-C846-4F9E-A744-DDD27AF7B023}" type="datetime1">
               <a:rPr lang="en-US" smtClean="0"/>
-              <a:t>6/6/2016</a:t>
+              <a:t>6/6/16</a:t>
             </a:fld>
             <a:endParaRPr lang="en-US"/>
           </a:p>
@@ -2697,7 +2697,7 @@
   <p:timing>
     <p:tnLst>
       <p:par>
-        <p:cTn id="1" dur="indefinite" restart="never" nodeType="tmRoot"/>
+        <p:cTn xmlns:p14="http://schemas.microsoft.com/office/powerpoint/2010/main" id="1" dur="indefinite" restart="never" nodeType="tmRoot"/>
       </p:par>
     </p:tnLst>
   </p:timing>
@@ -2738,7 +2738,7 @@
           <a:p>
             <a:fld id="{4266994C-F133-4678-952F-7A0A2923313C}" type="datetime1">
               <a:rPr lang="en-US" smtClean="0"/>
-              <a:t>6/6/2016</a:t>
+              <a:t>6/6/16</a:t>
             </a:fld>
             <a:endParaRPr lang="en-US"/>
           </a:p>
@@ -2799,7 +2799,7 @@
   <p:timing>
     <p:tnLst>
       <p:par>
-        <p:cTn id="1" dur="indefinite" restart="never" nodeType="tmRoot"/>
+        <p:cTn xmlns:p14="http://schemas.microsoft.com/office/powerpoint/2010/main" id="1" dur="indefinite" restart="never" nodeType="tmRoot"/>
       </p:par>
     </p:tnLst>
   </p:timing>
@@ -3029,7 +3029,7 @@
           <a:p>
             <a:fld id="{C64809A3-4844-41E9-82A2-94A6F337D48F}" type="datetime1">
               <a:rPr lang="en-US" smtClean="0"/>
-              <a:t>6/6/2016</a:t>
+              <a:t>6/6/16</a:t>
             </a:fld>
             <a:endParaRPr lang="en-US"/>
           </a:p>
@@ -3090,7 +3090,7 @@
   <p:timing>
     <p:tnLst>
       <p:par>
-        <p:cTn id="1" dur="indefinite" restart="never" nodeType="tmRoot"/>
+        <p:cTn xmlns:p14="http://schemas.microsoft.com/office/powerpoint/2010/main" id="1" dur="indefinite" restart="never" nodeType="tmRoot"/>
       </p:par>
     </p:tnLst>
   </p:timing>
@@ -3300,7 +3300,7 @@
           <a:p>
             <a:fld id="{34AC22AF-0AE9-4FD1-B79D-72A2C78BEA1F}" type="datetime1">
               <a:rPr lang="en-US" smtClean="0"/>
-              <a:t>6/6/2016</a:t>
+              <a:t>6/6/16</a:t>
             </a:fld>
             <a:endParaRPr lang="en-US"/>
           </a:p>
@@ -3361,7 +3361,7 @@
   <p:timing>
     <p:tnLst>
       <p:par>
-        <p:cTn id="1" dur="indefinite" restart="never" nodeType="tmRoot"/>
+        <p:cTn xmlns:p14="http://schemas.microsoft.com/office/powerpoint/2010/main" id="1" dur="indefinite" restart="never" nodeType="tmRoot"/>
       </p:par>
     </p:tnLst>
   </p:timing>
@@ -3527,7 +3527,7 @@
           <a:p>
             <a:fld id="{643D976A-48E0-4A2F-BA6C-64A94F7F9C41}" type="datetime1">
               <a:rPr lang="en-US" smtClean="0"/>
-              <a:t>6/6/2016</a:t>
+              <a:t>6/6/16</a:t>
             </a:fld>
             <a:endParaRPr lang="en-US"/>
           </a:p>
@@ -3661,7 +3661,7 @@
   <p:timing>
     <p:tnLst>
       <p:par>
-        <p:cTn id="1" dur="indefinite" restart="never" nodeType="tmRoot"/>
+        <p:cTn xmlns:p14="http://schemas.microsoft.com/office/powerpoint/2010/main" id="1" dur="indefinite" restart="never" nodeType="tmRoot"/>
       </p:par>
     </p:tnLst>
   </p:timing>
@@ -4036,7 +4036,7 @@
   <p:timing>
     <p:tnLst>
       <p:par>
-        <p:cTn id="1" dur="indefinite" restart="never" nodeType="tmRoot"/>
+        <p:cTn xmlns:p14="http://schemas.microsoft.com/office/powerpoint/2010/main" id="1" dur="indefinite" restart="never" nodeType="tmRoot"/>
       </p:par>
     </p:tnLst>
   </p:timing>
@@ -4135,7 +4135,7 @@
   <p:timing>
     <p:tnLst>
       <p:par>
-        <p:cTn id="1" dur="indefinite" restart="never" nodeType="tmRoot"/>
+        <p:cTn xmlns:p14="http://schemas.microsoft.com/office/powerpoint/2010/main" id="1" dur="indefinite" restart="never" nodeType="tmRoot"/>
       </p:par>
     </p:tnLst>
   </p:timing>
@@ -4258,7 +4258,7 @@
   <p:timing>
     <p:tnLst>
       <p:par>
-        <p:cTn id="1" dur="indefinite" restart="never" nodeType="tmRoot"/>
+        <p:cTn xmlns:p14="http://schemas.microsoft.com/office/powerpoint/2010/main" id="1" dur="indefinite" restart="never" nodeType="tmRoot"/>
       </p:par>
     </p:tnLst>
   </p:timing>
@@ -4398,7 +4398,6 @@
               <a:rPr lang="en-US" sz="3600" dirty="0" smtClean="0"/>
               <a:t>For teams of 2, combine the navigator and recorder roles</a:t>
             </a:r>
-            <a:endParaRPr lang="en-US" sz="3600" dirty="0" smtClean="0"/>
           </a:p>
           <a:p>
             <a:r>
@@ -4442,7 +4441,7 @@
   <p:timing>
     <p:tnLst>
       <p:par>
-        <p:cTn id="1" dur="indefinite" restart="never" nodeType="tmRoot"/>
+        <p:cTn xmlns:p14="http://schemas.microsoft.com/office/powerpoint/2010/main" id="1" dur="indefinite" restart="never" nodeType="tmRoot"/>
       </p:par>
     </p:tnLst>
   </p:timing>
@@ -4483,11 +4482,7 @@
           <a:p>
             <a:r>
               <a:rPr lang="en-US" dirty="0" smtClean="0"/>
-              <a:t>Who we are – fo</a:t>
-            </a:r>
-            <a:r>
-              <a:rPr lang="en-US" dirty="0" smtClean="0"/>
-              <a:t>ss2serve.org</a:t>
+              <a:t>Who we are – foss2serve.org</a:t>
             </a:r>
             <a:endParaRPr lang="en-US" dirty="0"/>
           </a:p>
@@ -4544,8 +4539,29 @@
             <a:pPr lvl="1"/>
             <a:r>
               <a:rPr lang="en-US" sz="1800" dirty="0"/>
-              <a:t>This work is copyrighted by the authors</a:t>
-            </a:r>
+              <a:t>This work is copyrighted by </a:t>
+            </a:r>
+            <a:r>
+              <a:rPr lang="en-US" sz="1800" dirty="0" err="1" smtClean="0"/>
+              <a:t>Darci</a:t>
+            </a:r>
+            <a:r>
+              <a:rPr lang="en-US" sz="1800" dirty="0" smtClean="0"/>
+              <a:t> </a:t>
+            </a:r>
+            <a:r>
+              <a:rPr lang="en-US" sz="1800" dirty="0" err="1" smtClean="0"/>
+              <a:t>Bruge</a:t>
+            </a:r>
+            <a:r>
+              <a:rPr lang="en-US" sz="1800" dirty="0" smtClean="0"/>
+              <a:t> and </a:t>
+            </a:r>
+            <a:r>
+              <a:rPr lang="en-US" sz="1800" smtClean="0"/>
+              <a:t>Stoney Jackson</a:t>
+            </a:r>
+            <a:endParaRPr lang="en-US" sz="1800" dirty="0"/>
           </a:p>
           <a:p>
             <a:pPr lvl="1"/>
@@ -4725,7 +4741,7 @@
           </a:prstGeom>
           <a:noFill/>
           <a:extLst>
-            <a:ext uri="{909E8E84-426E-40DD-AFC4-6F175D3DCCD1}">
+            <a:ext uri="{909E8E84-426E-40dd-AFC4-6F175D3DCCD1}">
               <a14:hiddenFill xmlns:a14="http://schemas.microsoft.com/office/drawing/2010/main">
                 <a:solidFill>
                   <a:srgbClr val="FFFFFF"/>
@@ -4748,7 +4764,7 @@
   <p:timing>
     <p:tnLst>
       <p:par>
-        <p:cTn id="1" dur="indefinite" restart="never" nodeType="tmRoot"/>
+        <p:cTn xmlns:p14="http://schemas.microsoft.com/office/powerpoint/2010/main" id="1" dur="indefinite" restart="never" nodeType="tmRoot"/>
       </p:par>
     </p:tnLst>
   </p:timing>
@@ -5051,7 +5067,7 @@
     </a:clrScheme>
     <a:fontScheme name="Office">
       <a:majorFont>
-        <a:latin typeface="Calibri Light" panose="020F0302020204030204"/>
+        <a:latin typeface="Calibri Light"/>
         <a:ea typeface=""/>
         <a:cs typeface=""/>
         <a:font script="Jpan" typeface="ＭＳ Ｐゴシック"/>
@@ -5086,7 +5102,7 @@
         <a:font script="Geor" typeface="Sylfaen"/>
       </a:majorFont>
       <a:minorFont>
-        <a:latin typeface="Calibri" panose="020F0502020204030204"/>
+        <a:latin typeface="Calibri"/>
         <a:ea typeface=""/>
         <a:cs typeface=""/>
         <a:font script="Jpan" typeface="ＭＳ Ｐゴシック"/>
@@ -5263,7 +5279,7 @@
   <a:extraClrSchemeLst/>
   <a:extLst>
     <a:ext uri="{05A4C25C-085E-4340-85A3-A5531E510DB2}">
-      <thm15:themeFamily xmlns:thm15="http://schemas.microsoft.com/office/thememl/2012/main" name="Office Theme" id="{62F939B6-93AF-4DB8-9C6B-D6C7DFDC589F}" vid="{4A3C46E8-61CC-4603-A589-7422A47A8E4A}"/>
+      <thm15:themeFamily xmlns:thm15="http://schemas.microsoft.com/office/thememl/2012/main" xmlns="" name="Office Theme" id="{62F939B6-93AF-4DB8-9C6B-D6C7DFDC589F}" vid="{4A3C46E8-61CC-4603-A589-7422A47A8E4A}"/>
     </a:ext>
   </a:extLst>
 </a:theme>

</xml_diff>